<commit_message>
switch problem order cp15m slides15m
</commit_message>
<xml_diff>
--- a/fall11/slidesF11/slides15m.pptx
+++ b/fall11/slidesF11/slides15m.pptx
@@ -5705,7 +5705,7 @@
           <a:graphicData uri="http://schemas.openxmlformats.org/presentationml/2006/ole">
             <mc:AlternateContent xmlns:mc="http://schemas.openxmlformats.org/markup-compatibility/2006">
               <mc:Choice xmlns:v="urn:schemas-microsoft-com:vml" Requires="v">
-                <p:oleObj spid="_x0000_s493587" name="Equation" r:id="rId4" imgW="2032000" imgH="596900" progId="Equation.DSMT4">
+                <p:oleObj spid="_x0000_s493594" name="Equation" r:id="rId4" imgW="2032000" imgH="596900" progId="Equation.DSMT4">
                   <p:embed/>
                 </p:oleObj>
               </mc:Choice>
@@ -5848,7 +5848,7 @@
           <a:graphicData uri="http://schemas.openxmlformats.org/presentationml/2006/ole">
             <mc:AlternateContent xmlns:mc="http://schemas.openxmlformats.org/markup-compatibility/2006">
               <mc:Choice xmlns:v="urn:schemas-microsoft-com:vml" Requires="v">
-                <p:oleObj spid="_x0000_s493588" name="Equation" r:id="rId6" imgW="1168400" imgH="596900" progId="Equation.DSMT4">
+                <p:oleObj spid="_x0000_s493595" name="Equation" r:id="rId6" imgW="1168400" imgH="596900" progId="Equation.DSMT4">
                   <p:embed/>
                 </p:oleObj>
               </mc:Choice>
@@ -5917,7 +5917,7 @@
           <a:graphicData uri="http://schemas.openxmlformats.org/presentationml/2006/ole">
             <mc:AlternateContent xmlns:mc="http://schemas.openxmlformats.org/markup-compatibility/2006">
               <mc:Choice xmlns:v="urn:schemas-microsoft-com:vml" Requires="v">
-                <p:oleObj spid="_x0000_s493589" name="Equation" r:id="rId8" imgW="1663700" imgH="355600" progId="Equation.DSMT4">
+                <p:oleObj spid="_x0000_s493596" name="Equation" r:id="rId8" imgW="1663700" imgH="355600" progId="Equation.DSMT4">
                   <p:embed/>
                 </p:oleObj>
               </mc:Choice>
@@ -7140,13 +7140,8 @@
             </a:r>
             <a:r>
               <a:rPr lang="en-US" sz="5400" dirty="0" smtClean="0"/>
-              <a:t>average </a:t>
-            </a:r>
-            <a:r>
-              <a:rPr lang="en-US" sz="5400" dirty="0" smtClean="0"/>
-              <a:t>in the river.</a:t>
-            </a:r>
-            <a:endParaRPr lang="en-US" sz="5400" dirty="0" smtClean="0"/>
+              <a:t>average in the river.</a:t>
+            </a:r>
           </a:p>
           <a:p>
             <a:pPr eaLnBrk="1" hangingPunct="1"/>
@@ -8172,13 +8167,7 @@
               <a:rPr lang="en-US" sz="4800" dirty="0" smtClean="0">
                 <a:latin typeface="Comic Sans MS" pitchFamily="66" charset="0"/>
               </a:rPr>
-              <a:t>, </a:t>
-            </a:r>
-            <a:r>
-              <a:rPr lang="en-US" sz="4800" dirty="0" smtClean="0">
-                <a:latin typeface="Comic Sans MS" pitchFamily="66" charset="0"/>
-              </a:rPr>
-              <a:t>in the river.</a:t>
+              <a:t>, in the river.</a:t>
             </a:r>
             <a:endParaRPr lang="en-US" sz="4800" dirty="0">
               <a:latin typeface="Comic Sans MS" pitchFamily="66" charset="0"/>
@@ -8384,13 +8373,7 @@
               <a:rPr lang="en-US" sz="4800" dirty="0" smtClean="0">
                 <a:latin typeface="Comic Sans MS" pitchFamily="66" charset="0"/>
               </a:rPr>
-              <a:t>the </a:t>
-            </a:r>
-            <a:r>
-              <a:rPr lang="en-US" sz="4800" dirty="0" smtClean="0">
-                <a:latin typeface="Comic Sans MS" pitchFamily="66" charset="0"/>
-              </a:rPr>
-              <a:t>actual </a:t>
+              <a:t>the actual </a:t>
             </a:r>
             <a:r>
               <a:rPr lang="en-US" sz="5400" kern="0" dirty="0" err="1" smtClean="0">
@@ -8408,16 +8391,7 @@
                 </a:solidFill>
                 <a:latin typeface="Comic Sans MS"/>
               </a:rPr>
-              <a:t> </a:t>
-            </a:r>
-            <a:r>
-              <a:rPr lang="en-US" sz="5400" kern="0" dirty="0" smtClean="0">
-                <a:solidFill>
-                  <a:srgbClr val="000000"/>
-                </a:solidFill>
-                <a:latin typeface="Comic Sans MS"/>
-              </a:rPr>
-              <a:t>CMD</a:t>
+              <a:t> CMD</a:t>
             </a:r>
           </a:p>
           <a:p>
@@ -8457,16 +8431,7 @@
                 </a:solidFill>
                 <a:latin typeface="Comic Sans MS"/>
               </a:rPr>
-              <a:t> </a:t>
-            </a:r>
-            <a:r>
-              <a:rPr lang="en-US" sz="5400" kern="0" dirty="0" smtClean="0">
-                <a:solidFill>
-                  <a:srgbClr val="006600"/>
-                </a:solidFill>
-                <a:latin typeface="Comic Sans MS"/>
-              </a:rPr>
-              <a:t>200</a:t>
+              <a:t> 200</a:t>
             </a:r>
             <a:endParaRPr lang="en-US" sz="4800" dirty="0">
               <a:latin typeface="Comic Sans MS" pitchFamily="66" charset="0"/>
@@ -9869,7 +9834,7 @@
           <a:graphicData uri="http://schemas.openxmlformats.org/presentationml/2006/ole">
             <mc:AlternateContent xmlns:mc="http://schemas.openxmlformats.org/markup-compatibility/2006">
               <mc:Choice xmlns:v="urn:schemas-microsoft-com:vml" Requires="v">
-                <p:oleObj spid="_x0000_s1040" name="Equation" r:id="rId5" imgW="762000" imgH="381000" progId="Equation.DSMT4">
+                <p:oleObj spid="_x0000_s1043" name="Equation" r:id="rId5" imgW="762000" imgH="381000" progId="Equation.DSMT4">
                   <p:embed/>
                 </p:oleObj>
               </mc:Choice>
@@ -10661,7 +10626,7 @@
           <a:graphicData uri="http://schemas.openxmlformats.org/presentationml/2006/ole">
             <mc:AlternateContent xmlns:mc="http://schemas.openxmlformats.org/markup-compatibility/2006">
               <mc:Choice xmlns:v="urn:schemas-microsoft-com:vml" Requires="v">
-                <p:oleObj spid="_x0000_s489515" name="Equation" r:id="rId5" imgW="1816100" imgH="330200" progId="Equation.DSMT4">
+                <p:oleObj spid="_x0000_s489520" name="Equation" r:id="rId5" imgW="1816100" imgH="330200" progId="Equation.DSMT4">
                   <p:embed/>
                 </p:oleObj>
               </mc:Choice>
@@ -10731,7 +10696,7 @@
           <a:graphicData uri="http://schemas.openxmlformats.org/presentationml/2006/ole">
             <mc:AlternateContent xmlns:mc="http://schemas.openxmlformats.org/markup-compatibility/2006">
               <mc:Choice xmlns:v="urn:schemas-microsoft-com:vml" Requires="v">
-                <p:oleObj spid="_x0000_s489516" name="Equation" r:id="rId7" imgW="1714500" imgH="596900" progId="Equation.DSMT4">
+                <p:oleObj spid="_x0000_s489521" name="Equation" r:id="rId7" imgW="1714500" imgH="596900" progId="Equation.DSMT4">
                   <p:embed/>
                 </p:oleObj>
               </mc:Choice>
@@ -11283,7 +11248,7 @@
           <a:graphicData uri="http://schemas.openxmlformats.org/presentationml/2006/ole">
             <mc:AlternateContent xmlns:mc="http://schemas.openxmlformats.org/markup-compatibility/2006">
               <mc:Choice xmlns:v="urn:schemas-microsoft-com:vml" Requires="v">
-                <p:oleObj spid="_x0000_s490513" name="Equation" r:id="rId5" imgW="1790700" imgH="482600" progId="Equation.DSMT4">
+                <p:oleObj spid="_x0000_s490516" name="Equation" r:id="rId5" imgW="1790700" imgH="482600" progId="Equation.DSMT4">
                   <p:embed/>
                 </p:oleObj>
               </mc:Choice>
@@ -17418,7 +17383,7 @@
           <a:graphicData uri="http://schemas.openxmlformats.org/presentationml/2006/ole">
             <mc:AlternateContent xmlns:mc="http://schemas.openxmlformats.org/markup-compatibility/2006">
               <mc:Choice xmlns:v="urn:schemas-microsoft-com:vml" Requires="v">
-                <p:oleObj spid="_x0000_s491537" name="Equation" r:id="rId5" imgW="1816100" imgH="482600" progId="Equation.DSMT4">
+                <p:oleObj spid="_x0000_s491540" name="Equation" r:id="rId5" imgW="1816100" imgH="482600" progId="Equation.DSMT4">
                   <p:embed/>
                 </p:oleObj>
               </mc:Choice>
@@ -19909,7 +19874,7 @@
           <a:graphicData uri="http://schemas.openxmlformats.org/presentationml/2006/ole">
             <mc:AlternateContent xmlns:mc="http://schemas.openxmlformats.org/markup-compatibility/2006">
               <mc:Choice xmlns:v="urn:schemas-microsoft-com:vml" Requires="v">
-                <p:oleObj spid="_x0000_s492587" name="Equation" r:id="rId5" imgW="2273300" imgH="482600" progId="Equation.DSMT4">
+                <p:oleObj spid="_x0000_s492594" name="Equation" r:id="rId5" imgW="2273300" imgH="482600" progId="Equation.DSMT4">
                   <p:embed/>
                 </p:oleObj>
               </mc:Choice>
@@ -19966,7 +19931,7 @@
           <a:graphicData uri="http://schemas.openxmlformats.org/presentationml/2006/ole">
             <mc:AlternateContent xmlns:mc="http://schemas.openxmlformats.org/markup-compatibility/2006">
               <mc:Choice xmlns:v="urn:schemas-microsoft-com:vml" Requires="v">
-                <p:oleObj spid="_x0000_s492588" name="Equation" r:id="rId7" imgW="571500" imgH="241300" progId="Equation.DSMT4">
+                <p:oleObj spid="_x0000_s492595" name="Equation" r:id="rId7" imgW="571500" imgH="241300" progId="Equation.DSMT4">
                   <p:embed/>
                 </p:oleObj>
               </mc:Choice>
@@ -20048,7 +20013,7 @@
           <a:graphicData uri="http://schemas.openxmlformats.org/presentationml/2006/ole">
             <mc:AlternateContent xmlns:mc="http://schemas.openxmlformats.org/markup-compatibility/2006">
               <mc:Choice xmlns:v="urn:schemas-microsoft-com:vml" Requires="v">
-                <p:oleObj spid="_x0000_s492589" name="Equation" r:id="rId9" imgW="2476500" imgH="482600" progId="Equation.DSMT4">
+                <p:oleObj spid="_x0000_s492596" name="Equation" r:id="rId9" imgW="2476500" imgH="482600" progId="Equation.DSMT4">
                   <p:embed/>
                 </p:oleObj>
               </mc:Choice>
@@ -21530,8 +21495,12 @@
               </a:lnSpc>
             </a:pPr>
             <a:r>
-              <a:rPr lang="en-US" sz="10600"/>
-              <a:t>2,3,4, 1</a:t>
+              <a:rPr lang="en-US" sz="10600" dirty="0" smtClean="0"/>
+              <a:t>1－</a:t>
+            </a:r>
+            <a:r>
+              <a:rPr lang="en-US" sz="10600" dirty="0"/>
+              <a:t>4</a:t>
             </a:r>
             <a:endParaRPr lang="en-US" sz="10600" dirty="0" smtClean="0"/>
           </a:p>
@@ -22610,15 +22579,7 @@
                   <a:srgbClr val="000000"/>
                 </a:solidFill>
               </a:rPr>
-              <a:t> </a:t>
-            </a:r>
-            <a:r>
-              <a:rPr lang="en-US" sz="5400" dirty="0" smtClean="0">
-                <a:solidFill>
-                  <a:srgbClr val="000000"/>
-                </a:solidFill>
-              </a:rPr>
-              <a:t>is </a:t>
+              <a:t> is </a:t>
             </a:r>
             <a:r>
               <a:rPr lang="en-US" sz="5400" b="1" dirty="0" smtClean="0">
@@ -22679,13 +22640,13 @@
   <p:clrMapOvr>
     <a:masterClrMapping/>
   </p:clrMapOvr>
-  <mc:AlternateContent xmlns:mc="http://schemas.openxmlformats.org/markup-compatibility/2006">
-    <mc:Choice xmlns:p14="http://schemas.microsoft.com/office/powerpoint/2010/main" Requires="p14">
+  <mc:AlternateContent xmlns:mc="http://schemas.openxmlformats.org/markup-compatibility/2006" xmlns:p14="http://schemas.microsoft.com/office/powerpoint/2010/main">
+    <mc:Choice Requires="p14">
       <p:transition spd="med" p14:dur="550">
         <p:fade/>
       </p:transition>
     </mc:Choice>
-    <mc:Fallback>
+    <mc:Fallback xmlns="">
       <p:transition xmlns:p14="http://schemas.microsoft.com/office/powerpoint/2010/main" spd="med">
         <p:fade/>
       </p:transition>
@@ -23036,11 +22997,7 @@
             </a:r>
             <a:r>
               <a:rPr lang="en-US" sz="5400" dirty="0" smtClean="0"/>
-              <a:t> </a:t>
-            </a:r>
-            <a:r>
-              <a:rPr lang="en-US" sz="5400" dirty="0" smtClean="0"/>
-              <a:t>average?</a:t>
+              <a:t> average?</a:t>
             </a:r>
             <a:endParaRPr lang="en-US" sz="7200" dirty="0" smtClean="0"/>
           </a:p>
@@ -23217,21 +23174,8 @@
             </a:r>
             <a:r>
               <a:rPr lang="en-US" sz="4000" dirty="0" smtClean="0"/>
-              <a:t>::= </a:t>
-            </a:r>
-            <a:r>
-              <a:rPr lang="en-US" sz="4000" dirty="0" smtClean="0"/>
-              <a:t>actual average </a:t>
-            </a:r>
-            <a:r>
-              <a:rPr lang="en-US" sz="4000" dirty="0" smtClean="0"/>
-              <a:t>CMD </a:t>
-            </a:r>
-            <a:r>
-              <a:rPr lang="en-US" sz="4000" dirty="0" smtClean="0"/>
-              <a:t>in river</a:t>
-            </a:r>
-            <a:endParaRPr lang="en-US" sz="4000" dirty="0" smtClean="0"/>
+              <a:t>::= actual average CMD in river</a:t>
+            </a:r>
           </a:p>
           <a:p>
             <a:pPr marL="0" indent="0" eaLnBrk="1" hangingPunct="1"/>
@@ -23882,7 +23826,7 @@
           <a:graphicData uri="http://schemas.openxmlformats.org/presentationml/2006/ole">
             <mc:AlternateContent xmlns:mc="http://schemas.openxmlformats.org/markup-compatibility/2006">
               <mc:Choice xmlns:v="urn:schemas-microsoft-com:vml" Requires="v">
-                <p:oleObj spid="_x0000_s426080" name="Equation" r:id="rId4" imgW="1854200" imgH="596900" progId="Equation.DSMT4">
+                <p:oleObj spid="_x0000_s426087" name="Equation" r:id="rId4" imgW="1854200" imgH="596900" progId="Equation.DSMT4">
                   <p:embed/>
                 </p:oleObj>
               </mc:Choice>
@@ -23958,7 +23902,7 @@
           <a:graphicData uri="http://schemas.openxmlformats.org/presentationml/2006/ole">
             <mc:AlternateContent xmlns:mc="http://schemas.openxmlformats.org/markup-compatibility/2006">
               <mc:Choice xmlns:v="urn:schemas-microsoft-com:vml" Requires="v">
-                <p:oleObj spid="_x0000_s426081" name="Equation" r:id="rId6" imgW="2032000" imgH="596900" progId="Equation.DSMT4">
+                <p:oleObj spid="_x0000_s426088" name="Equation" r:id="rId6" imgW="2032000" imgH="596900" progId="Equation.DSMT4">
                   <p:embed/>
                 </p:oleObj>
               </mc:Choice>
@@ -24052,7 +23996,7 @@
           <a:graphicData uri="http://schemas.openxmlformats.org/presentationml/2006/ole">
             <mc:AlternateContent xmlns:mc="http://schemas.openxmlformats.org/markup-compatibility/2006">
               <mc:Choice xmlns:v="urn:schemas-microsoft-com:vml" Requires="v">
-                <p:oleObj spid="_x0000_s426082" name="Equation" r:id="rId8" imgW="1879600" imgH="215900" progId="Equation.DSMT4">
+                <p:oleObj spid="_x0000_s426089" name="Equation" r:id="rId8" imgW="1879600" imgH="215900" progId="Equation.DSMT4">
                   <p:embed/>
                 </p:oleObj>
               </mc:Choice>
@@ -24691,7 +24635,7 @@
           <a:graphicData uri="http://schemas.openxmlformats.org/presentationml/2006/ole">
             <mc:AlternateContent xmlns:mc="http://schemas.openxmlformats.org/markup-compatibility/2006">
               <mc:Choice xmlns:v="urn:schemas-microsoft-com:vml" Requires="v">
-                <p:oleObj spid="_x0000_s438383" name="Equation" r:id="rId4" imgW="2057400" imgH="596900" progId="Equation.DSMT4">
+                <p:oleObj spid="_x0000_s438390" name="Equation" r:id="rId4" imgW="2057400" imgH="596900" progId="Equation.DSMT4">
                   <p:embed/>
                 </p:oleObj>
               </mc:Choice>
@@ -24767,7 +24711,7 @@
           <a:graphicData uri="http://schemas.openxmlformats.org/presentationml/2006/ole">
             <mc:AlternateContent xmlns:mc="http://schemas.openxmlformats.org/markup-compatibility/2006">
               <mc:Choice xmlns:v="urn:schemas-microsoft-com:vml" Requires="v">
-                <p:oleObj spid="_x0000_s438384" name="Equation" r:id="rId6" imgW="889000" imgH="469900" progId="Equation.DSMT4">
+                <p:oleObj spid="_x0000_s438391" name="Equation" r:id="rId6" imgW="889000" imgH="469900" progId="Equation.DSMT4">
                   <p:embed/>
                 </p:oleObj>
               </mc:Choice>
@@ -24837,7 +24781,7 @@
           <a:graphicData uri="http://schemas.openxmlformats.org/presentationml/2006/ole">
             <mc:AlternateContent xmlns:mc="http://schemas.openxmlformats.org/markup-compatibility/2006">
               <mc:Choice xmlns:v="urn:schemas-microsoft-com:vml" Requires="v">
-                <p:oleObj spid="_x0000_s438385" name="Equation" r:id="rId8" imgW="1879600" imgH="215900" progId="Equation.DSMT4">
+                <p:oleObj spid="_x0000_s438392" name="Equation" r:id="rId8" imgW="1879600" imgH="215900" progId="Equation.DSMT4">
                   <p:embed/>
                 </p:oleObj>
               </mc:Choice>
@@ -24896,13 +24840,13 @@
   <p:clrMapOvr>
     <a:masterClrMapping/>
   </p:clrMapOvr>
-  <mc:AlternateContent xmlns:mc="http://schemas.openxmlformats.org/markup-compatibility/2006">
-    <mc:Choice xmlns:p14="http://schemas.microsoft.com/office/powerpoint/2010/main" Requires="p14">
+  <mc:AlternateContent xmlns:mc="http://schemas.openxmlformats.org/markup-compatibility/2006" xmlns:p14="http://schemas.microsoft.com/office/powerpoint/2010/main">
+    <mc:Choice Requires="p14">
       <p:transition spd="med" p14:dur="700">
         <p:fade/>
       </p:transition>
     </mc:Choice>
-    <mc:Fallback>
+    <mc:Fallback xmlns="">
       <p:transition xmlns:p14="http://schemas.microsoft.com/office/powerpoint/2010/main" spd="med">
         <p:fade/>
       </p:transition>

</xml_diff>